<commit_message>
remove the exposuretime .pdf from the artifacts since it's not being run anymore
</commit_message>
<xml_diff>
--- a/documents/sample_workflow_dependency_new.pptx
+++ b/documents/sample_workflow_dependency_new.pptx
@@ -250,7 +250,7 @@
           <a:p>
             <a:fld id="{053D9C46-81F7-41F7-AFAE-BFEBBA175E9B}" type="datetimeFigureOut">
               <a:rPr lang="en-US" smtClean="0"/>
-              <a:t>9/1/21</a:t>
+              <a:t>9/2/21</a:t>
             </a:fld>
             <a:endParaRPr lang="en-US"/>
           </a:p>
@@ -418,7 +418,7 @@
           <a:p>
             <a:fld id="{053D9C46-81F7-41F7-AFAE-BFEBBA175E9B}" type="datetimeFigureOut">
               <a:rPr lang="en-US" smtClean="0"/>
-              <a:t>9/1/21</a:t>
+              <a:t>9/2/21</a:t>
             </a:fld>
             <a:endParaRPr lang="en-US"/>
           </a:p>
@@ -596,7 +596,7 @@
           <a:p>
             <a:fld id="{053D9C46-81F7-41F7-AFAE-BFEBBA175E9B}" type="datetimeFigureOut">
               <a:rPr lang="en-US" smtClean="0"/>
-              <a:t>9/1/21</a:t>
+              <a:t>9/2/21</a:t>
             </a:fld>
             <a:endParaRPr lang="en-US"/>
           </a:p>
@@ -764,7 +764,7 @@
           <a:p>
             <a:fld id="{053D9C46-81F7-41F7-AFAE-BFEBBA175E9B}" type="datetimeFigureOut">
               <a:rPr lang="en-US" smtClean="0"/>
-              <a:t>9/1/21</a:t>
+              <a:t>9/2/21</a:t>
             </a:fld>
             <a:endParaRPr lang="en-US"/>
           </a:p>
@@ -1009,7 +1009,7 @@
           <a:p>
             <a:fld id="{053D9C46-81F7-41F7-AFAE-BFEBBA175E9B}" type="datetimeFigureOut">
               <a:rPr lang="en-US" smtClean="0"/>
-              <a:t>9/1/21</a:t>
+              <a:t>9/2/21</a:t>
             </a:fld>
             <a:endParaRPr lang="en-US"/>
           </a:p>
@@ -1238,7 +1238,7 @@
           <a:p>
             <a:fld id="{053D9C46-81F7-41F7-AFAE-BFEBBA175E9B}" type="datetimeFigureOut">
               <a:rPr lang="en-US" smtClean="0"/>
-              <a:t>9/1/21</a:t>
+              <a:t>9/2/21</a:t>
             </a:fld>
             <a:endParaRPr lang="en-US"/>
           </a:p>
@@ -1602,7 +1602,7 @@
           <a:p>
             <a:fld id="{053D9C46-81F7-41F7-AFAE-BFEBBA175E9B}" type="datetimeFigureOut">
               <a:rPr lang="en-US" smtClean="0"/>
-              <a:t>9/1/21</a:t>
+              <a:t>9/2/21</a:t>
             </a:fld>
             <a:endParaRPr lang="en-US"/>
           </a:p>
@@ -1719,7 +1719,7 @@
           <a:p>
             <a:fld id="{053D9C46-81F7-41F7-AFAE-BFEBBA175E9B}" type="datetimeFigureOut">
               <a:rPr lang="en-US" smtClean="0"/>
-              <a:t>9/1/21</a:t>
+              <a:t>9/2/21</a:t>
             </a:fld>
             <a:endParaRPr lang="en-US"/>
           </a:p>
@@ -1814,7 +1814,7 @@
           <a:p>
             <a:fld id="{053D9C46-81F7-41F7-AFAE-BFEBBA175E9B}" type="datetimeFigureOut">
               <a:rPr lang="en-US" smtClean="0"/>
-              <a:t>9/1/21</a:t>
+              <a:t>9/2/21</a:t>
             </a:fld>
             <a:endParaRPr lang="en-US"/>
           </a:p>
@@ -2089,7 +2089,7 @@
           <a:p>
             <a:fld id="{053D9C46-81F7-41F7-AFAE-BFEBBA175E9B}" type="datetimeFigureOut">
               <a:rPr lang="en-US" smtClean="0"/>
-              <a:t>9/1/21</a:t>
+              <a:t>9/2/21</a:t>
             </a:fld>
             <a:endParaRPr lang="en-US"/>
           </a:p>
@@ -2341,7 +2341,7 @@
           <a:p>
             <a:fld id="{053D9C46-81F7-41F7-AFAE-BFEBBA175E9B}" type="datetimeFigureOut">
               <a:rPr lang="en-US" smtClean="0"/>
-              <a:t>9/1/21</a:t>
+              <a:t>9/2/21</a:t>
             </a:fld>
             <a:endParaRPr lang="en-US"/>
           </a:p>
@@ -2552,7 +2552,7 @@
           <a:p>
             <a:fld id="{053D9C46-81F7-41F7-AFAE-BFEBBA175E9B}" type="datetimeFigureOut">
               <a:rPr lang="en-US" smtClean="0"/>
-              <a:t>9/1/21</a:t>
+              <a:t>9/2/21</a:t>
             </a:fld>
             <a:endParaRPr lang="en-US"/>
           </a:p>
@@ -9194,6 +9194,59 @@
       </p:sp>
       <p:sp>
         <p:nvSpPr>
+          <p:cNvPr id="183" name="Rounded Rectangle 182">
+            <a:extLst>
+              <a:ext uri="{FF2B5EF4-FFF2-40B4-BE49-F238E27FC236}">
+                <a16:creationId xmlns:a16="http://schemas.microsoft.com/office/drawing/2014/main" id="{E9F8D668-0F41-2C4F-80A6-75AF33356BDC}"/>
+              </a:ext>
+            </a:extLst>
+          </p:cNvPr>
+          <p:cNvSpPr/>
+          <p:nvPr/>
+        </p:nvSpPr>
+        <p:spPr>
+          <a:xfrm>
+            <a:off x="329483" y="1638878"/>
+            <a:ext cx="1100530" cy="1209241"/>
+          </a:xfrm>
+          <a:prstGeom prst="roundRect">
+            <a:avLst>
+              <a:gd name="adj" fmla="val 5054"/>
+            </a:avLst>
+          </a:prstGeom>
+          <a:solidFill>
+            <a:schemeClr val="bg1">
+              <a:lumMod val="85000"/>
+            </a:schemeClr>
+          </a:solidFill>
+        </p:spPr>
+        <p:style>
+          <a:lnRef idx="2">
+            <a:schemeClr val="accent1">
+              <a:shade val="50000"/>
+            </a:schemeClr>
+          </a:lnRef>
+          <a:fillRef idx="1">
+            <a:schemeClr val="accent1"/>
+          </a:fillRef>
+          <a:effectRef idx="0">
+            <a:schemeClr val="accent1"/>
+          </a:effectRef>
+          <a:fontRef idx="minor">
+            <a:schemeClr val="lt1"/>
+          </a:fontRef>
+        </p:style>
+        <p:txBody>
+          <a:bodyPr rtlCol="0" anchor="ctr"/>
+          <a:lstStyle/>
+          <a:p>
+            <a:pPr algn="ctr"/>
+            <a:endParaRPr lang="en-US" sz="1200" dirty="0"/>
+          </a:p>
+        </p:txBody>
+      </p:sp>
+      <p:sp>
+        <p:nvSpPr>
           <p:cNvPr id="407" name="Rounded Rectangle 406">
             <a:extLst>
               <a:ext uri="{FF2B5EF4-FFF2-40B4-BE49-F238E27FC236}">
@@ -14503,7 +14556,18 @@
                   <a:schemeClr val="tx1"/>
                 </a:solidFill>
               </a:rPr>
-              <a:t>warping</a:t>
+              <a:t>Warping</a:t>
+            </a:r>
+          </a:p>
+          <a:p>
+            <a:pPr algn="ctr"/>
+            <a:r>
+              <a:rPr lang="en-US" sz="800" dirty="0">
+                <a:solidFill>
+                  <a:schemeClr val="tx1"/>
+                </a:solidFill>
+              </a:rPr>
+              <a:t>fits</a:t>
             </a:r>
           </a:p>
         </p:txBody>
@@ -15682,51 +15746,6 @@
           </a:fontRef>
         </p:style>
       </p:cxnSp>
-      <p:cxnSp>
-        <p:nvCxnSpPr>
-          <p:cNvPr id="171" name="Curved Connector 170">
-            <a:extLst>
-              <a:ext uri="{FF2B5EF4-FFF2-40B4-BE49-F238E27FC236}">
-                <a16:creationId xmlns:a16="http://schemas.microsoft.com/office/drawing/2014/main" id="{D863DB0B-9F0F-844C-90C8-7E21610FBA9D}"/>
-              </a:ext>
-            </a:extLst>
-          </p:cNvPr>
-          <p:cNvCxnSpPr>
-            <a:cxnSpLocks/>
-            <a:stCxn id="197" idx="1"/>
-            <a:endCxn id="188" idx="3"/>
-          </p:cNvCxnSpPr>
-          <p:nvPr/>
-        </p:nvCxnSpPr>
-        <p:spPr>
-          <a:xfrm rot="10800000">
-            <a:off x="1298170" y="2486225"/>
-            <a:ext cx="320153" cy="34846"/>
-          </a:xfrm>
-          <a:prstGeom prst="curvedConnector3">
-            <a:avLst>
-              <a:gd name="adj1" fmla="val 50000"/>
-            </a:avLst>
-          </a:prstGeom>
-          <a:ln>
-            <a:tailEnd type="triangle"/>
-          </a:ln>
-        </p:spPr>
-        <p:style>
-          <a:lnRef idx="1">
-            <a:schemeClr val="accent1"/>
-          </a:lnRef>
-          <a:fillRef idx="0">
-            <a:schemeClr val="accent1"/>
-          </a:fillRef>
-          <a:effectRef idx="0">
-            <a:schemeClr val="accent1"/>
-          </a:effectRef>
-          <a:fontRef idx="minor">
-            <a:schemeClr val="tx1"/>
-          </a:fontRef>
-        </p:style>
-      </p:cxnSp>
       <p:sp>
         <p:nvSpPr>
           <p:cNvPr id="161" name="Rounded Rectangle 160">
@@ -15748,9 +15767,9 @@
             <a:avLst/>
           </a:prstGeom>
           <a:solidFill>
-            <a:schemeClr val="accent2">
-              <a:lumMod val="20000"/>
-              <a:lumOff val="80000"/>
+            <a:schemeClr val="accent3">
+              <a:lumMod val="40000"/>
+              <a:lumOff val="60000"/>
             </a:schemeClr>
           </a:solidFill>
         </p:spPr>
@@ -16289,14 +16308,14 @@
           <p:cNvCxnSpPr>
             <a:cxnSpLocks/>
             <a:stCxn id="161" idx="2"/>
-            <a:endCxn id="188" idx="0"/>
+            <a:endCxn id="183" idx="0"/>
           </p:cNvCxnSpPr>
           <p:nvPr/>
         </p:nvCxnSpPr>
         <p:spPr>
           <a:xfrm rot="5400000">
-            <a:off x="462517" y="1435491"/>
-            <a:ext cx="1329591" cy="535388"/>
+            <a:off x="837133" y="1081005"/>
+            <a:ext cx="600488" cy="515258"/>
           </a:xfrm>
           <a:prstGeom prst="curvedConnector3">
             <a:avLst>
@@ -16442,6 +16461,210 @@
           </a:fontRef>
         </p:style>
       </p:cxnSp>
+      <p:sp>
+        <p:nvSpPr>
+          <p:cNvPr id="172" name="Rounded Rectangle 171">
+            <a:extLst>
+              <a:ext uri="{FF2B5EF4-FFF2-40B4-BE49-F238E27FC236}">
+                <a16:creationId xmlns:a16="http://schemas.microsoft.com/office/drawing/2014/main" id="{C04E14E5-DE33-EA40-9F56-7591C1129AEF}"/>
+              </a:ext>
+            </a:extLst>
+          </p:cNvPr>
+          <p:cNvSpPr/>
+          <p:nvPr/>
+        </p:nvSpPr>
+        <p:spPr>
+          <a:xfrm>
+            <a:off x="415396" y="1872041"/>
+            <a:ext cx="877102" cy="236487"/>
+          </a:xfrm>
+          <a:prstGeom prst="roundRect">
+            <a:avLst/>
+          </a:prstGeom>
+          <a:solidFill>
+            <a:schemeClr val="accent2">
+              <a:lumMod val="20000"/>
+              <a:lumOff val="80000"/>
+            </a:schemeClr>
+          </a:solidFill>
+          <a:ln>
+            <a:solidFill>
+              <a:schemeClr val="accent6">
+                <a:lumMod val="50000"/>
+              </a:schemeClr>
+            </a:solidFill>
+          </a:ln>
+        </p:spPr>
+        <p:style>
+          <a:lnRef idx="2">
+            <a:schemeClr val="accent1">
+              <a:shade val="50000"/>
+            </a:schemeClr>
+          </a:lnRef>
+          <a:fillRef idx="1">
+            <a:schemeClr val="accent1"/>
+          </a:fillRef>
+          <a:effectRef idx="0">
+            <a:schemeClr val="accent1"/>
+          </a:effectRef>
+          <a:fontRef idx="minor">
+            <a:schemeClr val="lt1"/>
+          </a:fontRef>
+        </p:style>
+        <p:txBody>
+          <a:bodyPr rtlCol="0" anchor="ctr"/>
+          <a:lstStyle/>
+          <a:p>
+            <a:pPr algn="ctr"/>
+            <a:r>
+              <a:rPr lang="en-US" sz="800" dirty="0">
+                <a:solidFill>
+                  <a:schemeClr val="tx1"/>
+                </a:solidFill>
+              </a:rPr>
+              <a:t>Warping</a:t>
+            </a:r>
+          </a:p>
+          <a:p>
+            <a:pPr algn="ctr"/>
+            <a:r>
+              <a:rPr lang="en-US" sz="800" dirty="0">
+                <a:solidFill>
+                  <a:schemeClr val="tx1"/>
+                </a:solidFill>
+              </a:rPr>
+              <a:t>Octet finding</a:t>
+            </a:r>
+          </a:p>
+        </p:txBody>
+      </p:sp>
+      <p:cxnSp>
+        <p:nvCxnSpPr>
+          <p:cNvPr id="176" name="Curved Connector 175">
+            <a:extLst>
+              <a:ext uri="{FF2B5EF4-FFF2-40B4-BE49-F238E27FC236}">
+                <a16:creationId xmlns:a16="http://schemas.microsoft.com/office/drawing/2014/main" id="{3B8E9BDF-E6C6-A64C-825E-94640540D5CC}"/>
+              </a:ext>
+            </a:extLst>
+          </p:cNvPr>
+          <p:cNvCxnSpPr>
+            <a:cxnSpLocks/>
+            <a:stCxn id="197" idx="1"/>
+            <a:endCxn id="183" idx="0"/>
+          </p:cNvCxnSpPr>
+          <p:nvPr/>
+        </p:nvCxnSpPr>
+        <p:spPr>
+          <a:xfrm rot="10800000">
+            <a:off x="879748" y="1638879"/>
+            <a:ext cx="738574" cy="882193"/>
+          </a:xfrm>
+          <a:prstGeom prst="curvedConnector4">
+            <a:avLst>
+              <a:gd name="adj1" fmla="val 12748"/>
+              <a:gd name="adj2" fmla="val 125913"/>
+            </a:avLst>
+          </a:prstGeom>
+          <a:ln>
+            <a:tailEnd type="triangle"/>
+          </a:ln>
+        </p:spPr>
+        <p:style>
+          <a:lnRef idx="1">
+            <a:schemeClr val="accent1"/>
+          </a:lnRef>
+          <a:fillRef idx="0">
+            <a:schemeClr val="accent1"/>
+          </a:fillRef>
+          <a:effectRef idx="0">
+            <a:schemeClr val="accent1"/>
+          </a:effectRef>
+          <a:fontRef idx="minor">
+            <a:schemeClr val="tx1"/>
+          </a:fontRef>
+        </p:style>
+      </p:cxnSp>
+      <p:cxnSp>
+        <p:nvCxnSpPr>
+          <p:cNvPr id="181" name="Curved Connector 180">
+            <a:extLst>
+              <a:ext uri="{FF2B5EF4-FFF2-40B4-BE49-F238E27FC236}">
+                <a16:creationId xmlns:a16="http://schemas.microsoft.com/office/drawing/2014/main" id="{348E4800-A98D-0A46-8E42-0C3AC8FACE26}"/>
+              </a:ext>
+            </a:extLst>
+          </p:cNvPr>
+          <p:cNvCxnSpPr>
+            <a:cxnSpLocks/>
+            <a:stCxn id="172" idx="2"/>
+            <a:endCxn id="188" idx="0"/>
+          </p:cNvCxnSpPr>
+          <p:nvPr/>
+        </p:nvCxnSpPr>
+        <p:spPr>
+          <a:xfrm rot="16200000" flipH="1">
+            <a:off x="727056" y="2235418"/>
+            <a:ext cx="259453" cy="5671"/>
+          </a:xfrm>
+          <a:prstGeom prst="curvedConnector3">
+            <a:avLst>
+              <a:gd name="adj1" fmla="val 50000"/>
+            </a:avLst>
+          </a:prstGeom>
+          <a:ln>
+            <a:tailEnd type="triangle"/>
+          </a:ln>
+        </p:spPr>
+        <p:style>
+          <a:lnRef idx="1">
+            <a:schemeClr val="accent1"/>
+          </a:lnRef>
+          <a:fillRef idx="0">
+            <a:schemeClr val="accent1"/>
+          </a:fillRef>
+          <a:effectRef idx="0">
+            <a:schemeClr val="accent1"/>
+          </a:effectRef>
+          <a:fontRef idx="minor">
+            <a:schemeClr val="tx1"/>
+          </a:fontRef>
+        </p:style>
+      </p:cxnSp>
+      <p:sp>
+        <p:nvSpPr>
+          <p:cNvPr id="186" name="TextBox 185">
+            <a:extLst>
+              <a:ext uri="{FF2B5EF4-FFF2-40B4-BE49-F238E27FC236}">
+                <a16:creationId xmlns:a16="http://schemas.microsoft.com/office/drawing/2014/main" id="{542A1315-DAD1-B145-AF5B-1CD359CE4488}"/>
+              </a:ext>
+            </a:extLst>
+          </p:cNvPr>
+          <p:cNvSpPr txBox="1"/>
+          <p:nvPr/>
+        </p:nvSpPr>
+        <p:spPr>
+          <a:xfrm>
+            <a:off x="95388" y="1614039"/>
+            <a:ext cx="878081" cy="276999"/>
+          </a:xfrm>
+          <a:prstGeom prst="rect">
+            <a:avLst/>
+          </a:prstGeom>
+          <a:noFill/>
+        </p:spPr>
+        <p:txBody>
+          <a:bodyPr wrap="square" rtlCol="0">
+            <a:spAutoFit/>
+          </a:bodyPr>
+          <a:lstStyle/>
+          <a:p>
+            <a:pPr algn="r"/>
+            <a:r>
+              <a:rPr lang="en-US" sz="1200" dirty="0"/>
+              <a:t>warping</a:t>
+            </a:r>
+          </a:p>
+        </p:txBody>
+      </p:sp>
     </p:spTree>
     <p:extLst>
       <p:ext uri="{BB962C8B-B14F-4D97-AF65-F5344CB8AC3E}">

</xml_diff>